<commit_message>
Add the website logo to icon.pptx
</commit_message>
<xml_diff>
--- a/assets/Icon.pptx
+++ b/assets/Icon.pptx
@@ -6,6 +6,7 @@
   </p:sldMasterIdLst>
   <p:sldIdLst>
     <p:sldId id="256" r:id="rId2"/>
+    <p:sldId id="257" r:id="rId3"/>
   </p:sldIdLst>
   <p:sldSz cx="9144000" cy="6858000" type="screen4x3"/>
   <p:notesSz cx="6858000" cy="9144000"/>
@@ -104,6 +105,22 @@
       </a:defRPr>
     </a:lvl9pPr>
   </p:defaultTextStyle>
+  <p:extLst>
+    <p:ext uri="{EFAFB233-063F-42B5-8137-9DF3F51BA10A}">
+      <p15:sldGuideLst xmlns:p15="http://schemas.microsoft.com/office/powerpoint/2012/main">
+        <p15:guide id="1" orient="horz" pos="2160">
+          <p15:clr>
+            <a:srgbClr val="A4A3A4"/>
+          </p15:clr>
+        </p15:guide>
+        <p15:guide id="2" pos="2880">
+          <p15:clr>
+            <a:srgbClr val="A4A3A4"/>
+          </p15:clr>
+        </p15:guide>
+      </p15:sldGuideLst>
+    </p:ext>
+  </p:extLst>
 </p:presentation>
 </file>
 
@@ -288,7 +305,7 @@
           <a:p>
             <a:fld id="{FC348DA7-B8DF-426C-A96F-9A69FD3B5392}" type="datetimeFigureOut">
               <a:rPr kumimoji="1" lang="ja-JP" altLang="en-US" smtClean="0"/>
-              <a:t>2022/6/1</a:t>
+              <a:t>2022/6/2</a:t>
             </a:fld>
             <a:endParaRPr kumimoji="1" lang="ja-JP" altLang="en-US"/>
           </a:p>
@@ -490,7 +507,7 @@
           <a:p>
             <a:fld id="{FC348DA7-B8DF-426C-A96F-9A69FD3B5392}" type="datetimeFigureOut">
               <a:rPr kumimoji="1" lang="ja-JP" altLang="en-US" smtClean="0"/>
-              <a:t>2022/6/1</a:t>
+              <a:t>2022/6/2</a:t>
             </a:fld>
             <a:endParaRPr kumimoji="1" lang="ja-JP" altLang="en-US"/>
           </a:p>
@@ -702,7 +719,7 @@
           <a:p>
             <a:fld id="{FC348DA7-B8DF-426C-A96F-9A69FD3B5392}" type="datetimeFigureOut">
               <a:rPr kumimoji="1" lang="ja-JP" altLang="en-US" smtClean="0"/>
-              <a:t>2022/6/1</a:t>
+              <a:t>2022/6/2</a:t>
             </a:fld>
             <a:endParaRPr kumimoji="1" lang="ja-JP" altLang="en-US"/>
           </a:p>
@@ -904,7 +921,7 @@
           <a:p>
             <a:fld id="{FC348DA7-B8DF-426C-A96F-9A69FD3B5392}" type="datetimeFigureOut">
               <a:rPr kumimoji="1" lang="ja-JP" altLang="en-US" smtClean="0"/>
-              <a:t>2022/6/1</a:t>
+              <a:t>2022/6/2</a:t>
             </a:fld>
             <a:endParaRPr kumimoji="1" lang="ja-JP" altLang="en-US"/>
           </a:p>
@@ -1150,7 +1167,7 @@
           <a:p>
             <a:fld id="{FC348DA7-B8DF-426C-A96F-9A69FD3B5392}" type="datetimeFigureOut">
               <a:rPr kumimoji="1" lang="ja-JP" altLang="en-US" smtClean="0"/>
-              <a:t>2022/6/1</a:t>
+              <a:t>2022/6/2</a:t>
             </a:fld>
             <a:endParaRPr kumimoji="1" lang="ja-JP" altLang="en-US"/>
           </a:p>
@@ -1502,7 +1519,7 @@
           <a:p>
             <a:fld id="{FC348DA7-B8DF-426C-A96F-9A69FD3B5392}" type="datetimeFigureOut">
               <a:rPr kumimoji="1" lang="ja-JP" altLang="en-US" smtClean="0"/>
-              <a:t>2022/6/1</a:t>
+              <a:t>2022/6/2</a:t>
             </a:fld>
             <a:endParaRPr kumimoji="1" lang="ja-JP" altLang="en-US"/>
           </a:p>
@@ -1988,7 +2005,7 @@
           <a:p>
             <a:fld id="{FC348DA7-B8DF-426C-A96F-9A69FD3B5392}" type="datetimeFigureOut">
               <a:rPr kumimoji="1" lang="ja-JP" altLang="en-US" smtClean="0"/>
-              <a:t>2022/6/1</a:t>
+              <a:t>2022/6/2</a:t>
             </a:fld>
             <a:endParaRPr kumimoji="1" lang="ja-JP" altLang="en-US"/>
           </a:p>
@@ -2106,7 +2123,7 @@
           <a:p>
             <a:fld id="{FC348DA7-B8DF-426C-A96F-9A69FD3B5392}" type="datetimeFigureOut">
               <a:rPr kumimoji="1" lang="ja-JP" altLang="en-US" smtClean="0"/>
-              <a:t>2022/6/1</a:t>
+              <a:t>2022/6/2</a:t>
             </a:fld>
             <a:endParaRPr kumimoji="1" lang="ja-JP" altLang="en-US"/>
           </a:p>
@@ -2201,7 +2218,7 @@
           <a:p>
             <a:fld id="{FC348DA7-B8DF-426C-A96F-9A69FD3B5392}" type="datetimeFigureOut">
               <a:rPr kumimoji="1" lang="ja-JP" altLang="en-US" smtClean="0"/>
-              <a:t>2022/6/1</a:t>
+              <a:t>2022/6/2</a:t>
             </a:fld>
             <a:endParaRPr kumimoji="1" lang="ja-JP" altLang="en-US"/>
           </a:p>
@@ -2510,7 +2527,7 @@
           <a:p>
             <a:fld id="{FC348DA7-B8DF-426C-A96F-9A69FD3B5392}" type="datetimeFigureOut">
               <a:rPr kumimoji="1" lang="ja-JP" altLang="en-US" smtClean="0"/>
-              <a:t>2022/6/1</a:t>
+              <a:t>2022/6/2</a:t>
             </a:fld>
             <a:endParaRPr kumimoji="1" lang="ja-JP" altLang="en-US"/>
           </a:p>
@@ -2763,7 +2780,7 @@
           <a:p>
             <a:fld id="{FC348DA7-B8DF-426C-A96F-9A69FD3B5392}" type="datetimeFigureOut">
               <a:rPr kumimoji="1" lang="ja-JP" altLang="en-US" smtClean="0"/>
-              <a:t>2022/6/1</a:t>
+              <a:t>2022/6/2</a:t>
             </a:fld>
             <a:endParaRPr kumimoji="1" lang="ja-JP" altLang="en-US"/>
           </a:p>
@@ -3008,7 +3025,7 @@
           <a:p>
             <a:fld id="{FC348DA7-B8DF-426C-A96F-9A69FD3B5392}" type="datetimeFigureOut">
               <a:rPr kumimoji="1" lang="ja-JP" altLang="en-US" smtClean="0"/>
-              <a:t>2022/6/1</a:t>
+              <a:t>2022/6/2</a:t>
             </a:fld>
             <a:endParaRPr kumimoji="1" lang="ja-JP" altLang="en-US"/>
           </a:p>
@@ -3431,8 +3448,8 @@
           </a:p>
         </p:txBody>
       </p:sp>
-      <mc:AlternateContent xmlns:mc="http://schemas.openxmlformats.org/markup-compatibility/2006">
-        <mc:Choice xmlns:a14="http://schemas.microsoft.com/office/drawing/2010/main" Requires="a14">
+      <mc:AlternateContent xmlns:mc="http://schemas.openxmlformats.org/markup-compatibility/2006" xmlns:a14="http://schemas.microsoft.com/office/drawing/2010/main">
+        <mc:Choice Requires="a14">
           <p:sp>
             <p:nvSpPr>
               <p:cNvPr id="7" name="テキスト ボックス 6"/>
@@ -3469,7 +3486,7 @@
                               <a:solidFill>
                                 <a:schemeClr val="accent1"/>
                               </a:solidFill>
-                              <a:latin typeface="Cambria Math"/>
+                              <a:latin typeface="Cambria Math" panose="02040503050406030204" pitchFamily="18" charset="0"/>
                             </a:rPr>
                           </m:ctrlPr>
                         </m:fPr>
@@ -3483,7 +3500,7 @@
                                   <a:solidFill>
                                     <a:schemeClr val="accent1"/>
                                   </a:solidFill>
-                                  <a:latin typeface="Cambria Math"/>
+                                  <a:latin typeface="Cambria Math" panose="02040503050406030204" pitchFamily="18" charset="0"/>
                                 </a:rPr>
                               </m:ctrlPr>
                             </m:dPr>
@@ -3525,7 +3542,7 @@
                                   <a:solidFill>
                                     <a:schemeClr val="accent1"/>
                                   </a:solidFill>
-                                  <a:latin typeface="Cambria Math"/>
+                                  <a:latin typeface="Cambria Math" panose="02040503050406030204" pitchFamily="18" charset="0"/>
                                 </a:rPr>
                               </m:ctrlPr>
                             </m:dPr>
@@ -3553,7 +3570,7 @@
                                   <a:solidFill>
                                     <a:schemeClr val="accent1"/>
                                   </a:solidFill>
-                                  <a:latin typeface="Cambria Math"/>
+                                  <a:latin typeface="Cambria Math" panose="02040503050406030204" pitchFamily="18" charset="0"/>
                                 </a:rPr>
                               </m:ctrlPr>
                             </m:dPr>
@@ -3586,7 +3603,7 @@
             </p:txBody>
           </p:sp>
         </mc:Choice>
-        <mc:Fallback>
+        <mc:Fallback xmlns="">
           <p:sp>
             <p:nvSpPr>
               <p:cNvPr id="7" name="テキスト ボックス 6"/>
@@ -3629,6 +3646,321 @@
     <p:extLst>
       <p:ext uri="{BB962C8B-B14F-4D97-AF65-F5344CB8AC3E}">
         <p14:creationId xmlns:p14="http://schemas.microsoft.com/office/powerpoint/2010/main" val="4046224945"/>
+      </p:ext>
+    </p:extLst>
+  </p:cSld>
+  <p:clrMapOvr>
+    <a:masterClrMapping/>
+  </p:clrMapOvr>
+</p:sld>
+</file>
+
+<file path=ppt/slides/slide2.xml><?xml version="1.0" encoding="utf-8"?>
+<p:sld xmlns:a="http://schemas.openxmlformats.org/drawingml/2006/main" xmlns:r="http://schemas.openxmlformats.org/officeDocument/2006/relationships" xmlns:p="http://schemas.openxmlformats.org/presentationml/2006/main">
+  <p:cSld>
+    <p:spTree>
+      <p:nvGrpSpPr>
+        <p:cNvPr id="1" name=""/>
+        <p:cNvGrpSpPr/>
+        <p:nvPr/>
+      </p:nvGrpSpPr>
+      <p:grpSpPr>
+        <a:xfrm>
+          <a:off x="0" y="0"/>
+          <a:ext cx="0" cy="0"/>
+          <a:chOff x="0" y="0"/>
+          <a:chExt cx="0" cy="0"/>
+        </a:xfrm>
+      </p:grpSpPr>
+      <p:sp>
+        <p:nvSpPr>
+          <p:cNvPr id="6" name="角丸四角形 5"/>
+          <p:cNvSpPr>
+            <a:spLocks noChangeAspect="1"/>
+          </p:cNvSpPr>
+          <p:nvPr/>
+        </p:nvSpPr>
+        <p:spPr>
+          <a:xfrm>
+            <a:off x="392361" y="1953306"/>
+            <a:ext cx="1224000" cy="1224000"/>
+          </a:xfrm>
+          <a:prstGeom prst="roundRect">
+            <a:avLst/>
+          </a:prstGeom>
+          <a:solidFill>
+            <a:schemeClr val="accent1">
+              <a:lumMod val="20000"/>
+              <a:lumOff val="80000"/>
+            </a:schemeClr>
+          </a:solidFill>
+          <a:ln>
+            <a:noFill/>
+          </a:ln>
+          <a:effectLst>
+            <a:outerShdw blurRad="50800" dist="38100" dir="2700000" algn="tl" rotWithShape="0">
+              <a:prstClr val="black">
+                <a:alpha val="40000"/>
+              </a:prstClr>
+            </a:outerShdw>
+          </a:effectLst>
+        </p:spPr>
+        <p:style>
+          <a:lnRef idx="1">
+            <a:schemeClr val="accent5"/>
+          </a:lnRef>
+          <a:fillRef idx="2">
+            <a:schemeClr val="accent5"/>
+          </a:fillRef>
+          <a:effectRef idx="1">
+            <a:schemeClr val="accent5"/>
+          </a:effectRef>
+          <a:fontRef idx="minor">
+            <a:schemeClr val="dk1"/>
+          </a:fontRef>
+        </p:style>
+        <p:txBody>
+          <a:bodyPr rtlCol="0" anchor="ctr"/>
+          <a:lstStyle/>
+          <a:p>
+            <a:pPr algn="ctr"/>
+            <a:endParaRPr kumimoji="1" lang="ja-JP" altLang="en-US"/>
+          </a:p>
+        </p:txBody>
+      </p:sp>
+      <mc:AlternateContent xmlns:mc="http://schemas.openxmlformats.org/markup-compatibility/2006">
+        <mc:Choice xmlns:a14="http://schemas.microsoft.com/office/drawing/2010/main" Requires="a14">
+          <p:sp>
+            <p:nvSpPr>
+              <p:cNvPr id="7" name="テキスト ボックス 6"/>
+              <p:cNvSpPr txBox="1"/>
+              <p:nvPr/>
+            </p:nvSpPr>
+            <p:spPr>
+              <a:xfrm>
+                <a:off x="305246" y="1963699"/>
+                <a:ext cx="1397434" cy="1119665"/>
+              </a:xfrm>
+              <a:prstGeom prst="rect">
+                <a:avLst/>
+              </a:prstGeom>
+              <a:noFill/>
+            </p:spPr>
+            <p:txBody>
+              <a:bodyPr wrap="none" rtlCol="0">
+                <a:spAutoFit/>
+              </a:bodyPr>
+              <a:lstStyle/>
+              <a:p>
+                <a:pPr/>
+                <a14:m>
+                  <m:oMathPara xmlns:m="http://schemas.openxmlformats.org/officeDocument/2006/math">
+                    <m:oMathParaPr>
+                      <m:jc m:val="center"/>
+                    </m:oMathParaPr>
+                    <m:oMath xmlns:m="http://schemas.openxmlformats.org/officeDocument/2006/math">
+                      <m:f>
+                        <m:fPr>
+                          <m:ctrlPr>
+                            <a:rPr kumimoji="1" lang="en-US" altLang="ja-JP" sz="3200" b="1" i="1" smtClean="0">
+                              <a:solidFill>
+                                <a:schemeClr val="accent1"/>
+                              </a:solidFill>
+                              <a:latin typeface="Cambria Math" panose="02040503050406030204" pitchFamily="18" charset="0"/>
+                            </a:rPr>
+                          </m:ctrlPr>
+                        </m:fPr>
+                        <m:num>
+                          <m:d>
+                            <m:dPr>
+                              <m:begChr m:val="["/>
+                              <m:endChr m:val="]"/>
+                              <m:ctrlPr>
+                                <a:rPr kumimoji="1" lang="en-US" altLang="ja-JP" sz="3200" b="1" i="1" smtClean="0">
+                                  <a:solidFill>
+                                    <a:schemeClr val="accent1"/>
+                                  </a:solidFill>
+                                  <a:latin typeface="Cambria Math" panose="02040503050406030204" pitchFamily="18" charset="0"/>
+                                </a:rPr>
+                              </m:ctrlPr>
+                            </m:dPr>
+                            <m:e>
+                              <m:r>
+                                <m:rPr>
+                                  <m:nor/>
+                                </m:rPr>
+                                <a:rPr kumimoji="1" lang="en-US" altLang="ja-JP" sz="3200" b="1" i="0" smtClean="0">
+                                  <a:solidFill>
+                                    <a:schemeClr val="tx2"/>
+                                  </a:solidFill>
+                                  <a:latin typeface="Cambria Math"/>
+                                </a:rPr>
+                                <m:t>M</m:t>
+                              </m:r>
+                              <m:r>
+                                <m:rPr>
+                                  <m:nor/>
+                                </m:rPr>
+                                <a:rPr kumimoji="1" lang="en-US" altLang="ja-JP" sz="3200" b="1" i="0" smtClean="0">
+                                  <a:solidFill>
+                                    <a:schemeClr val="tx1"/>
+                                  </a:solidFill>
+                                  <a:latin typeface="Cambria Math"/>
+                                </a:rPr>
+                                <m:t>L</m:t>
+                              </m:r>
+                            </m:e>
+                          </m:d>
+                        </m:num>
+                        <m:den>
+                          <m:d>
+                            <m:dPr>
+                              <m:begChr m:val="["/>
+                              <m:endChr m:val="]"/>
+                              <m:ctrlPr>
+                                <a:rPr kumimoji="1" lang="en-US" altLang="ja-JP" sz="3200" b="1" i="1" smtClean="0">
+                                  <a:solidFill>
+                                    <a:schemeClr val="accent1"/>
+                                  </a:solidFill>
+                                  <a:latin typeface="Cambria Math" panose="02040503050406030204" pitchFamily="18" charset="0"/>
+                                </a:rPr>
+                              </m:ctrlPr>
+                            </m:dPr>
+                            <m:e>
+                              <m:r>
+                                <m:rPr>
+                                  <m:nor/>
+                                </m:rPr>
+                                <a:rPr kumimoji="1" lang="en-US" altLang="ja-JP" sz="3200" b="1" i="0" smtClean="0">
+                                  <a:solidFill>
+                                    <a:schemeClr val="tx2"/>
+                                  </a:solidFill>
+                                  <a:latin typeface="Cambria Math"/>
+                                </a:rPr>
+                                <m:t>M</m:t>
+                              </m:r>
+                            </m:e>
+                          </m:d>
+                          <m:d>
+                            <m:dPr>
+                              <m:begChr m:val="["/>
+                              <m:endChr m:val="]"/>
+                              <m:ctrlPr>
+                                <a:rPr kumimoji="1" lang="en-US" altLang="ja-JP" sz="3200" b="1" i="1" smtClean="0">
+                                  <a:solidFill>
+                                    <a:schemeClr val="accent1"/>
+                                  </a:solidFill>
+                                  <a:latin typeface="Cambria Math" panose="02040503050406030204" pitchFamily="18" charset="0"/>
+                                </a:rPr>
+                              </m:ctrlPr>
+                            </m:dPr>
+                            <m:e>
+                              <m:r>
+                                <m:rPr>
+                                  <m:nor/>
+                                </m:rPr>
+                                <a:rPr kumimoji="1" lang="en-US" altLang="ja-JP" sz="3200" b="1" i="0" smtClean="0">
+                                  <a:solidFill>
+                                    <a:schemeClr val="tx1"/>
+                                  </a:solidFill>
+                                  <a:latin typeface="Cambria Math"/>
+                                </a:rPr>
+                                <m:t>L</m:t>
+                              </m:r>
+                            </m:e>
+                          </m:d>
+                        </m:den>
+                      </m:f>
+                    </m:oMath>
+                  </m:oMathPara>
+                </a14:m>
+                <a:endParaRPr kumimoji="1" lang="ja-JP" altLang="en-US" sz="3200" b="1" dirty="0">
+                  <a:solidFill>
+                    <a:schemeClr val="accent1"/>
+                  </a:solidFill>
+                </a:endParaRPr>
+              </a:p>
+            </p:txBody>
+          </p:sp>
+        </mc:Choice>
+        <mc:Fallback>
+          <p:sp>
+            <p:nvSpPr>
+              <p:cNvPr id="7" name="テキスト ボックス 6"/>
+              <p:cNvSpPr txBox="1">
+                <a:spLocks noRot="1" noChangeAspect="1" noMove="1" noResize="1" noEditPoints="1" noAdjustHandles="1" noChangeArrowheads="1" noChangeShapeType="1" noTextEdit="1"/>
+              </p:cNvSpPr>
+              <p:nvPr/>
+            </p:nvSpPr>
+            <p:spPr>
+              <a:xfrm>
+                <a:off x="305246" y="1963699"/>
+                <a:ext cx="1397434" cy="1119665"/>
+              </a:xfrm>
+              <a:prstGeom prst="rect">
+                <a:avLst/>
+              </a:prstGeom>
+              <a:blipFill>
+                <a:blip r:embed="rId2"/>
+                <a:stretch>
+                  <a:fillRect/>
+                </a:stretch>
+              </a:blipFill>
+            </p:spPr>
+            <p:txBody>
+              <a:bodyPr/>
+              <a:lstStyle/>
+              <a:p>
+                <a:r>
+                  <a:rPr lang="ja-JP" altLang="en-US">
+                    <a:noFill/>
+                  </a:rPr>
+                  <a:t> </a:t>
+                </a:r>
+              </a:p>
+            </p:txBody>
+          </p:sp>
+        </mc:Fallback>
+      </mc:AlternateContent>
+      <p:sp>
+        <p:nvSpPr>
+          <p:cNvPr id="2" name="テキスト ボックス 1"/>
+          <p:cNvSpPr txBox="1"/>
+          <p:nvPr/>
+        </p:nvSpPr>
+        <p:spPr>
+          <a:xfrm>
+            <a:off x="1789795" y="1923366"/>
+            <a:ext cx="10800649" cy="1200329"/>
+          </a:xfrm>
+          <a:prstGeom prst="rect">
+            <a:avLst/>
+          </a:prstGeom>
+          <a:noFill/>
+        </p:spPr>
+        <p:txBody>
+          <a:bodyPr wrap="none" rtlCol="0">
+            <a:spAutoFit/>
+          </a:bodyPr>
+          <a:lstStyle/>
+          <a:p>
+            <a:r>
+              <a:rPr kumimoji="1" lang="en-US" altLang="ja-JP" sz="7200" dirty="0" smtClean="0">
+                <a:latin typeface="Cambria Math" panose="02040503050406030204" pitchFamily="18" charset="0"/>
+                <a:ea typeface="Cambria Math" panose="02040503050406030204" pitchFamily="18" charset="0"/>
+              </a:rPr>
+              <a:t>Stability Constant Explorer</a:t>
+            </a:r>
+            <a:endParaRPr kumimoji="1" lang="ja-JP" altLang="en-US" sz="7200" dirty="0">
+              <a:latin typeface="Cambria Math" panose="02040503050406030204" pitchFamily="18" charset="0"/>
+            </a:endParaRPr>
+          </a:p>
+        </p:txBody>
+      </p:sp>
+    </p:spTree>
+    <p:extLst>
+      <p:ext uri="{BB962C8B-B14F-4D97-AF65-F5344CB8AC3E}">
+        <p14:creationId xmlns:p14="http://schemas.microsoft.com/office/powerpoint/2010/main" val="698413450"/>
       </p:ext>
     </p:extLst>
   </p:cSld>

</xml_diff>